<commit_message>
Update to late 1960s
</commit_message>
<xml_diff>
--- a/HSTR121/ppts/The late 1960s.pptx
+++ b/HSTR121/ppts/The late 1960s.pptx
@@ -296,7 +296,7 @@
           </a:lstStyle>
           <a:p>
             <a:r>
-              <a:rPr lang="en-US" smtClean="0"/>
+              <a:rPr lang="en-US"/>
               <a:t>Click to edit Master title style</a:t>
             </a:r>
             <a:endParaRPr lang="en-US" dirty="0"/>
@@ -416,7 +416,7 @@
           </a:lstStyle>
           <a:p>
             <a:r>
-              <a:rPr lang="en-US" smtClean="0"/>
+              <a:rPr lang="en-US"/>
               <a:t>Click to edit Master subtitle style</a:t>
             </a:r>
             <a:endParaRPr lang="en-US" dirty="0"/>
@@ -455,7 +455,7 @@
           <a:p>
             <a:fld id="{1570E9FD-0F47-4482-9939-5478A7A6E089}" type="datetimeFigureOut">
               <a:rPr lang="en-US" smtClean="0"/>
-              <a:t>11/2/2016</a:t>
+              <a:t>2/20/18</a:t>
             </a:fld>
             <a:endParaRPr lang="en-US"/>
           </a:p>
@@ -1366,7 +1366,7 @@
           </a:lstStyle>
           <a:p>
             <a:r>
-              <a:rPr lang="en-US" smtClean="0"/>
+              <a:rPr lang="en-US"/>
               <a:t>Click to edit Master title style</a:t>
             </a:r>
             <a:endParaRPr lang="en-US" dirty="0"/>
@@ -1445,7 +1445,7 @@
           </a:lstStyle>
           <a:p>
             <a:r>
-              <a:rPr lang="en-US" smtClean="0"/>
+              <a:rPr lang="en-US"/>
               <a:t>Click icon to add picture</a:t>
             </a:r>
             <a:endParaRPr lang="en-US" dirty="0"/>
@@ -1520,7 +1520,7 @@
           <a:p>
             <a:pPr lvl="0"/>
             <a:r>
-              <a:rPr lang="en-US" smtClean="0"/>
+              <a:rPr lang="en-US"/>
               <a:t>Click to edit Master text styles</a:t>
             </a:r>
           </a:p>
@@ -1543,7 +1543,7 @@
           <a:p>
             <a:fld id="{1570E9FD-0F47-4482-9939-5478A7A6E089}" type="datetimeFigureOut">
               <a:rPr lang="en-US" smtClean="0"/>
-              <a:t>11/2/2016</a:t>
+              <a:t>2/20/18</a:t>
             </a:fld>
             <a:endParaRPr lang="en-US"/>
           </a:p>
@@ -2432,7 +2432,7 @@
           </a:lstStyle>
           <a:p>
             <a:r>
-              <a:rPr lang="en-US" smtClean="0"/>
+              <a:rPr lang="en-US"/>
               <a:t>Click to edit Master title style</a:t>
             </a:r>
             <a:endParaRPr lang="en-US" dirty="0"/>
@@ -2500,7 +2500,7 @@
           <a:p>
             <a:pPr lvl="0"/>
             <a:r>
-              <a:rPr lang="en-US" smtClean="0"/>
+              <a:rPr lang="en-US"/>
               <a:t>Click to edit Master text styles</a:t>
             </a:r>
           </a:p>
@@ -2523,7 +2523,7 @@
           <a:p>
             <a:fld id="{1570E9FD-0F47-4482-9939-5478A7A6E089}" type="datetimeFigureOut">
               <a:rPr lang="en-US" smtClean="0"/>
-              <a:t>11/2/2016</a:t>
+              <a:t>2/20/18</a:t>
             </a:fld>
             <a:endParaRPr lang="en-US"/>
           </a:p>
@@ -3490,7 +3490,7 @@
           </a:lstStyle>
           <a:p>
             <a:r>
-              <a:rPr lang="en-US" smtClean="0"/>
+              <a:rPr lang="en-US"/>
               <a:t>Click to edit Master title style</a:t>
             </a:r>
             <a:endParaRPr lang="en-US" dirty="0"/>
@@ -3567,7 +3567,7 @@
           <a:p>
             <a:pPr lvl="0"/>
             <a:r>
-              <a:rPr lang="en-US" smtClean="0"/>
+              <a:rPr lang="en-US"/>
               <a:t>Click to edit Master text styles</a:t>
             </a:r>
           </a:p>
@@ -3634,7 +3634,7 @@
           <a:p>
             <a:pPr lvl="0"/>
             <a:r>
-              <a:rPr lang="en-US" smtClean="0"/>
+              <a:rPr lang="en-US"/>
               <a:t>Click to edit Master text styles</a:t>
             </a:r>
           </a:p>
@@ -3657,7 +3657,7 @@
           <a:p>
             <a:fld id="{1570E9FD-0F47-4482-9939-5478A7A6E089}" type="datetimeFigureOut">
               <a:rPr lang="en-US" smtClean="0"/>
-              <a:t>11/2/2016</a:t>
+              <a:t>2/20/18</a:t>
             </a:fld>
             <a:endParaRPr lang="en-US"/>
           </a:p>
@@ -4546,7 +4546,7 @@
           </a:lstStyle>
           <a:p>
             <a:r>
-              <a:rPr lang="en-US" smtClean="0"/>
+              <a:rPr lang="en-US"/>
               <a:t>Click to edit Master title style</a:t>
             </a:r>
             <a:endParaRPr lang="en-US" dirty="0"/>
@@ -4667,7 +4667,7 @@
           <a:p>
             <a:pPr lvl="0"/>
             <a:r>
-              <a:rPr lang="en-US" smtClean="0"/>
+              <a:rPr lang="en-US"/>
               <a:t>Click to edit Master text styles</a:t>
             </a:r>
           </a:p>
@@ -4690,7 +4690,7 @@
           <a:p>
             <a:fld id="{1570E9FD-0F47-4482-9939-5478A7A6E089}" type="datetimeFigureOut">
               <a:rPr lang="en-US" smtClean="0"/>
-              <a:t>11/2/2016</a:t>
+              <a:t>2/20/18</a:t>
             </a:fld>
             <a:endParaRPr lang="en-US"/>
           </a:p>
@@ -4829,7 +4829,7 @@
           </a:lstStyle>
           <a:p>
             <a:r>
-              <a:rPr lang="en-US" smtClean="0"/>
+              <a:rPr lang="en-US"/>
               <a:t>Click to edit Master title style</a:t>
             </a:r>
             <a:endParaRPr lang="en-US" dirty="0"/>
@@ -4904,7 +4904,7 @@
           <a:p>
             <a:pPr lvl="0"/>
             <a:r>
-              <a:rPr lang="en-US" smtClean="0"/>
+              <a:rPr lang="en-US"/>
               <a:t>Click to edit Master text styles</a:t>
             </a:r>
           </a:p>
@@ -4971,7 +4971,7 @@
           <a:p>
             <a:pPr lvl="0"/>
             <a:r>
-              <a:rPr lang="en-US" smtClean="0"/>
+              <a:rPr lang="en-US"/>
               <a:t>Click to edit Master text styles</a:t>
             </a:r>
           </a:p>
@@ -5045,7 +5045,7 @@
           <a:p>
             <a:pPr lvl="0"/>
             <a:r>
-              <a:rPr lang="en-US" smtClean="0"/>
+              <a:rPr lang="en-US"/>
               <a:t>Click to edit Master text styles</a:t>
             </a:r>
           </a:p>
@@ -5112,7 +5112,7 @@
           <a:p>
             <a:pPr lvl="0"/>
             <a:r>
-              <a:rPr lang="en-US" smtClean="0"/>
+              <a:rPr lang="en-US"/>
               <a:t>Click to edit Master text styles</a:t>
             </a:r>
           </a:p>
@@ -5186,7 +5186,7 @@
           <a:p>
             <a:pPr lvl="0"/>
             <a:r>
-              <a:rPr lang="en-US" smtClean="0"/>
+              <a:rPr lang="en-US"/>
               <a:t>Click to edit Master text styles</a:t>
             </a:r>
           </a:p>
@@ -5253,7 +5253,7 @@
           <a:p>
             <a:pPr lvl="0"/>
             <a:r>
-              <a:rPr lang="en-US" smtClean="0"/>
+              <a:rPr lang="en-US"/>
               <a:t>Click to edit Master text styles</a:t>
             </a:r>
           </a:p>
@@ -5350,7 +5350,7 @@
           <a:p>
             <a:fld id="{1570E9FD-0F47-4482-9939-5478A7A6E089}" type="datetimeFigureOut">
               <a:rPr lang="en-US" smtClean="0"/>
-              <a:t>11/2/2016</a:t>
+              <a:t>2/20/18</a:t>
             </a:fld>
             <a:endParaRPr lang="en-US"/>
           </a:p>
@@ -5453,7 +5453,7 @@
           </a:lstStyle>
           <a:p>
             <a:r>
-              <a:rPr lang="en-US" smtClean="0"/>
+              <a:rPr lang="en-US"/>
               <a:t>Click to edit Master title style</a:t>
             </a:r>
             <a:endParaRPr lang="en-US" dirty="0"/>
@@ -5528,7 +5528,7 @@
           <a:p>
             <a:pPr lvl="0"/>
             <a:r>
-              <a:rPr lang="en-US" smtClean="0"/>
+              <a:rPr lang="en-US"/>
               <a:t>Click to edit Master text styles</a:t>
             </a:r>
           </a:p>
@@ -5606,7 +5606,7 @@
           </a:lstStyle>
           <a:p>
             <a:r>
-              <a:rPr lang="en-US" smtClean="0"/>
+              <a:rPr lang="en-US"/>
               <a:t>Click icon to add picture</a:t>
             </a:r>
             <a:endParaRPr lang="en-US" dirty="0"/>
@@ -5674,7 +5674,7 @@
           <a:p>
             <a:pPr lvl="0"/>
             <a:r>
-              <a:rPr lang="en-US" smtClean="0"/>
+              <a:rPr lang="en-US"/>
               <a:t>Click to edit Master text styles</a:t>
             </a:r>
           </a:p>
@@ -5748,7 +5748,7 @@
           <a:p>
             <a:pPr lvl="0"/>
             <a:r>
-              <a:rPr lang="en-US" smtClean="0"/>
+              <a:rPr lang="en-US"/>
               <a:t>Click to edit Master text styles</a:t>
             </a:r>
           </a:p>
@@ -5826,7 +5826,7 @@
           </a:lstStyle>
           <a:p>
             <a:r>
-              <a:rPr lang="en-US" smtClean="0"/>
+              <a:rPr lang="en-US"/>
               <a:t>Click icon to add picture</a:t>
             </a:r>
             <a:endParaRPr lang="en-US" dirty="0"/>
@@ -5894,7 +5894,7 @@
           <a:p>
             <a:pPr lvl="0"/>
             <a:r>
-              <a:rPr lang="en-US" smtClean="0"/>
+              <a:rPr lang="en-US"/>
               <a:t>Click to edit Master text styles</a:t>
             </a:r>
           </a:p>
@@ -5968,7 +5968,7 @@
           <a:p>
             <a:pPr lvl="0"/>
             <a:r>
-              <a:rPr lang="en-US" smtClean="0"/>
+              <a:rPr lang="en-US"/>
               <a:t>Click to edit Master text styles</a:t>
             </a:r>
           </a:p>
@@ -6046,7 +6046,7 @@
           </a:lstStyle>
           <a:p>
             <a:r>
-              <a:rPr lang="en-US" smtClean="0"/>
+              <a:rPr lang="en-US"/>
               <a:t>Click icon to add picture</a:t>
             </a:r>
             <a:endParaRPr lang="en-US" dirty="0"/>
@@ -6114,7 +6114,7 @@
           <a:p>
             <a:pPr lvl="0"/>
             <a:r>
-              <a:rPr lang="en-US" smtClean="0"/>
+              <a:rPr lang="en-US"/>
               <a:t>Click to edit Master text styles</a:t>
             </a:r>
           </a:p>
@@ -6211,7 +6211,7 @@
           <a:p>
             <a:fld id="{1570E9FD-0F47-4482-9939-5478A7A6E089}" type="datetimeFigureOut">
               <a:rPr lang="en-US" smtClean="0"/>
-              <a:t>11/2/2016</a:t>
+              <a:t>2/20/18</a:t>
             </a:fld>
             <a:endParaRPr lang="en-US"/>
           </a:p>
@@ -6315,7 +6315,7 @@
           <a:lstStyle/>
           <a:p>
             <a:r>
-              <a:rPr lang="en-US" smtClean="0"/>
+              <a:rPr lang="en-US"/>
               <a:t>Click to edit Master title style</a:t>
             </a:r>
             <a:endParaRPr lang="en-US" dirty="0"/>
@@ -6344,35 +6344,35 @@
           <a:p>
             <a:pPr lvl="0"/>
             <a:r>
-              <a:rPr lang="en-US" smtClean="0"/>
+              <a:rPr lang="en-US"/>
               <a:t>Click to edit Master text styles</a:t>
             </a:r>
           </a:p>
           <a:p>
             <a:pPr lvl="1"/>
             <a:r>
-              <a:rPr lang="en-US" smtClean="0"/>
+              <a:rPr lang="en-US"/>
               <a:t>Second level</a:t>
             </a:r>
           </a:p>
           <a:p>
             <a:pPr lvl="2"/>
             <a:r>
-              <a:rPr lang="en-US" smtClean="0"/>
+              <a:rPr lang="en-US"/>
               <a:t>Third level</a:t>
             </a:r>
           </a:p>
           <a:p>
             <a:pPr lvl="3"/>
             <a:r>
-              <a:rPr lang="en-US" smtClean="0"/>
+              <a:rPr lang="en-US"/>
               <a:t>Fourth level</a:t>
             </a:r>
           </a:p>
           <a:p>
             <a:pPr lvl="4"/>
             <a:r>
-              <a:rPr lang="en-US" smtClean="0"/>
+              <a:rPr lang="en-US"/>
               <a:t>Fifth level</a:t>
             </a:r>
             <a:endParaRPr lang="en-US" dirty="0"/>
@@ -6401,7 +6401,7 @@
           <a:p>
             <a:fld id="{1570E9FD-0F47-4482-9939-5478A7A6E089}" type="datetimeFigureOut">
               <a:rPr lang="en-US" smtClean="0"/>
-              <a:t>11/2/2016</a:t>
+              <a:t>2/20/18</a:t>
             </a:fld>
             <a:endParaRPr lang="en-US"/>
           </a:p>
@@ -7287,7 +7287,7 @@
           <a:lstStyle/>
           <a:p>
             <a:r>
-              <a:rPr lang="en-US" smtClean="0"/>
+              <a:rPr lang="en-US"/>
               <a:t>Click to edit Master title style</a:t>
             </a:r>
             <a:endParaRPr lang="en-US" dirty="0"/>
@@ -7316,35 +7316,35 @@
           <a:p>
             <a:pPr lvl="0"/>
             <a:r>
-              <a:rPr lang="en-US" smtClean="0"/>
+              <a:rPr lang="en-US"/>
               <a:t>Click to edit Master text styles</a:t>
             </a:r>
           </a:p>
           <a:p>
             <a:pPr lvl="1"/>
             <a:r>
-              <a:rPr lang="en-US" smtClean="0"/>
+              <a:rPr lang="en-US"/>
               <a:t>Second level</a:t>
             </a:r>
           </a:p>
           <a:p>
             <a:pPr lvl="2"/>
             <a:r>
-              <a:rPr lang="en-US" smtClean="0"/>
+              <a:rPr lang="en-US"/>
               <a:t>Third level</a:t>
             </a:r>
           </a:p>
           <a:p>
             <a:pPr lvl="3"/>
             <a:r>
-              <a:rPr lang="en-US" smtClean="0"/>
+              <a:rPr lang="en-US"/>
               <a:t>Fourth level</a:t>
             </a:r>
           </a:p>
           <a:p>
             <a:pPr lvl="4"/>
             <a:r>
-              <a:rPr lang="en-US" smtClean="0"/>
+              <a:rPr lang="en-US"/>
               <a:t>Fifth level</a:t>
             </a:r>
             <a:endParaRPr lang="en-US" dirty="0"/>
@@ -7373,7 +7373,7 @@
           <a:p>
             <a:fld id="{1570E9FD-0F47-4482-9939-5478A7A6E089}" type="datetimeFigureOut">
               <a:rPr lang="en-US" smtClean="0"/>
-              <a:t>11/2/2016</a:t>
+              <a:t>2/20/18</a:t>
             </a:fld>
             <a:endParaRPr lang="en-US"/>
           </a:p>
@@ -7503,7 +7503,7 @@
           <a:lstStyle/>
           <a:p>
             <a:r>
-              <a:rPr lang="en-US" smtClean="0"/>
+              <a:rPr lang="en-US"/>
               <a:t>Click to edit Master title style</a:t>
             </a:r>
             <a:endParaRPr lang="en-US" dirty="0"/>
@@ -7532,35 +7532,35 @@
           <a:p>
             <a:pPr lvl="0"/>
             <a:r>
-              <a:rPr lang="en-US" smtClean="0"/>
+              <a:rPr lang="en-US"/>
               <a:t>Click to edit Master text styles</a:t>
             </a:r>
           </a:p>
           <a:p>
             <a:pPr lvl="1"/>
             <a:r>
-              <a:rPr lang="en-US" smtClean="0"/>
+              <a:rPr lang="en-US"/>
               <a:t>Second level</a:t>
             </a:r>
           </a:p>
           <a:p>
             <a:pPr lvl="2"/>
             <a:r>
-              <a:rPr lang="en-US" smtClean="0"/>
+              <a:rPr lang="en-US"/>
               <a:t>Third level</a:t>
             </a:r>
           </a:p>
           <a:p>
             <a:pPr lvl="3"/>
             <a:r>
-              <a:rPr lang="en-US" smtClean="0"/>
+              <a:rPr lang="en-US"/>
               <a:t>Fourth level</a:t>
             </a:r>
           </a:p>
           <a:p>
             <a:pPr lvl="4"/>
             <a:r>
-              <a:rPr lang="en-US" smtClean="0"/>
+              <a:rPr lang="en-US"/>
               <a:t>Fifth level</a:t>
             </a:r>
             <a:endParaRPr lang="en-US" dirty="0"/>
@@ -7584,7 +7584,7 @@
           <a:p>
             <a:fld id="{1570E9FD-0F47-4482-9939-5478A7A6E089}" type="datetimeFigureOut">
               <a:rPr lang="en-US" smtClean="0"/>
-              <a:t>11/2/2016</a:t>
+              <a:t>2/20/18</a:t>
             </a:fld>
             <a:endParaRPr lang="en-US"/>
           </a:p>
@@ -8474,7 +8474,7 @@
           </a:lstStyle>
           <a:p>
             <a:r>
-              <a:rPr lang="en-US" smtClean="0"/>
+              <a:rPr lang="en-US"/>
               <a:t>Click to edit Master title style</a:t>
             </a:r>
             <a:endParaRPr lang="en-US" dirty="0"/>
@@ -8595,7 +8595,7 @@
           <a:p>
             <a:pPr lvl="0"/>
             <a:r>
-              <a:rPr lang="en-US" smtClean="0"/>
+              <a:rPr lang="en-US"/>
               <a:t>Click to edit Master text styles</a:t>
             </a:r>
           </a:p>
@@ -8618,7 +8618,7 @@
           <a:p>
             <a:fld id="{1570E9FD-0F47-4482-9939-5478A7A6E089}" type="datetimeFigureOut">
               <a:rPr lang="en-US" smtClean="0"/>
-              <a:t>11/2/2016</a:t>
+              <a:t>2/20/18</a:t>
             </a:fld>
             <a:endParaRPr lang="en-US"/>
           </a:p>
@@ -8748,7 +8748,7 @@
           <a:lstStyle/>
           <a:p>
             <a:r>
-              <a:rPr lang="en-US" smtClean="0"/>
+              <a:rPr lang="en-US"/>
               <a:t>Click to edit Master title style</a:t>
             </a:r>
             <a:endParaRPr lang="en-US" dirty="0"/>
@@ -8779,35 +8779,35 @@
           <a:p>
             <a:pPr lvl="0"/>
             <a:r>
-              <a:rPr lang="en-US" smtClean="0"/>
+              <a:rPr lang="en-US"/>
               <a:t>Click to edit Master text styles</a:t>
             </a:r>
           </a:p>
           <a:p>
             <a:pPr lvl="1"/>
             <a:r>
-              <a:rPr lang="en-US" smtClean="0"/>
+              <a:rPr lang="en-US"/>
               <a:t>Second level</a:t>
             </a:r>
           </a:p>
           <a:p>
             <a:pPr lvl="2"/>
             <a:r>
-              <a:rPr lang="en-US" smtClean="0"/>
+              <a:rPr lang="en-US"/>
               <a:t>Third level</a:t>
             </a:r>
           </a:p>
           <a:p>
             <a:pPr lvl="3"/>
             <a:r>
-              <a:rPr lang="en-US" smtClean="0"/>
+              <a:rPr lang="en-US"/>
               <a:t>Fourth level</a:t>
             </a:r>
           </a:p>
           <a:p>
             <a:pPr lvl="4"/>
             <a:r>
-              <a:rPr lang="en-US" smtClean="0"/>
+              <a:rPr lang="en-US"/>
               <a:t>Fifth level</a:t>
             </a:r>
             <a:endParaRPr lang="en-US" dirty="0"/>
@@ -8838,35 +8838,35 @@
           <a:p>
             <a:pPr lvl="0"/>
             <a:r>
-              <a:rPr lang="en-US" smtClean="0"/>
+              <a:rPr lang="en-US"/>
               <a:t>Click to edit Master text styles</a:t>
             </a:r>
           </a:p>
           <a:p>
             <a:pPr lvl="1"/>
             <a:r>
-              <a:rPr lang="en-US" smtClean="0"/>
+              <a:rPr lang="en-US"/>
               <a:t>Second level</a:t>
             </a:r>
           </a:p>
           <a:p>
             <a:pPr lvl="2"/>
             <a:r>
-              <a:rPr lang="en-US" smtClean="0"/>
+              <a:rPr lang="en-US"/>
               <a:t>Third level</a:t>
             </a:r>
           </a:p>
           <a:p>
             <a:pPr lvl="3"/>
             <a:r>
-              <a:rPr lang="en-US" smtClean="0"/>
+              <a:rPr lang="en-US"/>
               <a:t>Fourth level</a:t>
             </a:r>
           </a:p>
           <a:p>
             <a:pPr lvl="4"/>
             <a:r>
-              <a:rPr lang="en-US" smtClean="0"/>
+              <a:rPr lang="en-US"/>
               <a:t>Fifth level</a:t>
             </a:r>
             <a:endParaRPr lang="en-US" dirty="0"/>
@@ -8890,7 +8890,7 @@
           <a:p>
             <a:fld id="{1570E9FD-0F47-4482-9939-5478A7A6E089}" type="datetimeFigureOut">
               <a:rPr lang="en-US" smtClean="0"/>
-              <a:t>11/2/2016</a:t>
+              <a:t>2/20/18</a:t>
             </a:fld>
             <a:endParaRPr lang="en-US"/>
           </a:p>
@@ -8988,7 +8988,7 @@
           </a:lstStyle>
           <a:p>
             <a:r>
-              <a:rPr lang="en-US" smtClean="0"/>
+              <a:rPr lang="en-US"/>
               <a:t>Click to edit Master title style</a:t>
             </a:r>
             <a:endParaRPr lang="en-US" dirty="0"/>
@@ -9060,7 +9060,7 @@
           <a:p>
             <a:pPr lvl="0"/>
             <a:r>
-              <a:rPr lang="en-US" smtClean="0"/>
+              <a:rPr lang="en-US"/>
               <a:t>Click to edit Master text styles</a:t>
             </a:r>
           </a:p>
@@ -9090,35 +9090,35 @@
           <a:p>
             <a:pPr lvl="0"/>
             <a:r>
-              <a:rPr lang="en-US" smtClean="0"/>
+              <a:rPr lang="en-US"/>
               <a:t>Click to edit Master text styles</a:t>
             </a:r>
           </a:p>
           <a:p>
             <a:pPr lvl="1"/>
             <a:r>
-              <a:rPr lang="en-US" smtClean="0"/>
+              <a:rPr lang="en-US"/>
               <a:t>Second level</a:t>
             </a:r>
           </a:p>
           <a:p>
             <a:pPr lvl="2"/>
             <a:r>
-              <a:rPr lang="en-US" smtClean="0"/>
+              <a:rPr lang="en-US"/>
               <a:t>Third level</a:t>
             </a:r>
           </a:p>
           <a:p>
             <a:pPr lvl="3"/>
             <a:r>
-              <a:rPr lang="en-US" smtClean="0"/>
+              <a:rPr lang="en-US"/>
               <a:t>Fourth level</a:t>
             </a:r>
           </a:p>
           <a:p>
             <a:pPr lvl="4"/>
             <a:r>
-              <a:rPr lang="en-US" smtClean="0"/>
+              <a:rPr lang="en-US"/>
               <a:t>Fifth level</a:t>
             </a:r>
             <a:endParaRPr lang="en-US" dirty="0"/>
@@ -9190,7 +9190,7 @@
           <a:p>
             <a:pPr lvl="0"/>
             <a:r>
-              <a:rPr lang="en-US" smtClean="0"/>
+              <a:rPr lang="en-US"/>
               <a:t>Click to edit Master text styles</a:t>
             </a:r>
           </a:p>
@@ -9248,35 +9248,35 @@
           <a:p>
             <a:pPr lvl="0"/>
             <a:r>
-              <a:rPr lang="en-US" smtClean="0"/>
+              <a:rPr lang="en-US"/>
               <a:t>Click to edit Master text styles</a:t>
             </a:r>
           </a:p>
           <a:p>
             <a:pPr lvl="1"/>
             <a:r>
-              <a:rPr lang="en-US" smtClean="0"/>
+              <a:rPr lang="en-US"/>
               <a:t>Second level</a:t>
             </a:r>
           </a:p>
           <a:p>
             <a:pPr lvl="2"/>
             <a:r>
-              <a:rPr lang="en-US" smtClean="0"/>
+              <a:rPr lang="en-US"/>
               <a:t>Third level</a:t>
             </a:r>
           </a:p>
           <a:p>
             <a:pPr lvl="3"/>
             <a:r>
-              <a:rPr lang="en-US" smtClean="0"/>
+              <a:rPr lang="en-US"/>
               <a:t>Fourth level</a:t>
             </a:r>
           </a:p>
           <a:p>
             <a:pPr lvl="4"/>
             <a:r>
-              <a:rPr lang="en-US" smtClean="0"/>
+              <a:rPr lang="en-US"/>
               <a:t>Fifth level</a:t>
             </a:r>
             <a:endParaRPr lang="en-US" dirty="0"/>
@@ -9300,7 +9300,7 @@
           <a:p>
             <a:fld id="{1570E9FD-0F47-4482-9939-5478A7A6E089}" type="datetimeFigureOut">
               <a:rPr lang="en-US" smtClean="0"/>
-              <a:t>11/2/2016</a:t>
+              <a:t>2/20/18</a:t>
             </a:fld>
             <a:endParaRPr lang="en-US"/>
           </a:p>
@@ -9403,7 +9403,7 @@
           </a:lstStyle>
           <a:p>
             <a:r>
-              <a:rPr lang="en-US" smtClean="0"/>
+              <a:rPr lang="en-US"/>
               <a:t>Click to edit Master title style</a:t>
             </a:r>
             <a:endParaRPr lang="en-US" dirty="0"/>
@@ -9427,7 +9427,7 @@
           <a:p>
             <a:fld id="{1570E9FD-0F47-4482-9939-5478A7A6E089}" type="datetimeFigureOut">
               <a:rPr lang="en-US" smtClean="0"/>
-              <a:t>11/2/2016</a:t>
+              <a:t>2/20/18</a:t>
             </a:fld>
             <a:endParaRPr lang="en-US"/>
           </a:p>
@@ -9522,7 +9522,7 @@
           <a:p>
             <a:fld id="{1570E9FD-0F47-4482-9939-5478A7A6E089}" type="datetimeFigureOut">
               <a:rPr lang="en-US" smtClean="0"/>
-              <a:t>11/2/2016</a:t>
+              <a:t>2/20/18</a:t>
             </a:fld>
             <a:endParaRPr lang="en-US"/>
           </a:p>
@@ -10448,7 +10448,7 @@
           </a:lstStyle>
           <a:p>
             <a:r>
-              <a:rPr lang="en-US" smtClean="0"/>
+              <a:rPr lang="en-US"/>
               <a:t>Click to edit Master title style</a:t>
             </a:r>
             <a:endParaRPr lang="en-US" dirty="0"/>
@@ -10479,35 +10479,35 @@
           <a:p>
             <a:pPr lvl="0"/>
             <a:r>
-              <a:rPr lang="en-US" smtClean="0"/>
+              <a:rPr lang="en-US"/>
               <a:t>Click to edit Master text styles</a:t>
             </a:r>
           </a:p>
           <a:p>
             <a:pPr lvl="1"/>
             <a:r>
-              <a:rPr lang="en-US" smtClean="0"/>
+              <a:rPr lang="en-US"/>
               <a:t>Second level</a:t>
             </a:r>
           </a:p>
           <a:p>
             <a:pPr lvl="2"/>
             <a:r>
-              <a:rPr lang="en-US" smtClean="0"/>
+              <a:rPr lang="en-US"/>
               <a:t>Third level</a:t>
             </a:r>
           </a:p>
           <a:p>
             <a:pPr lvl="3"/>
             <a:r>
-              <a:rPr lang="en-US" smtClean="0"/>
+              <a:rPr lang="en-US"/>
               <a:t>Fourth level</a:t>
             </a:r>
           </a:p>
           <a:p>
             <a:pPr lvl="4"/>
             <a:r>
-              <a:rPr lang="en-US" smtClean="0"/>
+              <a:rPr lang="en-US"/>
               <a:t>Fifth level</a:t>
             </a:r>
             <a:endParaRPr lang="en-US" dirty="0"/>
@@ -10580,7 +10580,7 @@
           <a:p>
             <a:pPr lvl="0"/>
             <a:r>
-              <a:rPr lang="en-US" smtClean="0"/>
+              <a:rPr lang="en-US"/>
               <a:t>Click to edit Master text styles</a:t>
             </a:r>
           </a:p>
@@ -10603,7 +10603,7 @@
           <a:p>
             <a:fld id="{1570E9FD-0F47-4482-9939-5478A7A6E089}" type="datetimeFigureOut">
               <a:rPr lang="en-US" smtClean="0"/>
-              <a:t>11/2/2016</a:t>
+              <a:t>2/20/18</a:t>
             </a:fld>
             <a:endParaRPr lang="en-US"/>
           </a:p>
@@ -11531,7 +11531,7 @@
           </a:lstStyle>
           <a:p>
             <a:r>
-              <a:rPr lang="en-US" smtClean="0"/>
+              <a:rPr lang="en-US"/>
               <a:t>Click to edit Master title style</a:t>
             </a:r>
             <a:endParaRPr lang="en-US" dirty="0"/>
@@ -11613,7 +11613,7 @@
               <a:buNone/>
             </a:pPr>
             <a:r>
-              <a:rPr lang="en-US" smtClean="0"/>
+              <a:rPr lang="en-US"/>
               <a:t>Click icon to add picture</a:t>
             </a:r>
             <a:endParaRPr lang="en-US" dirty="0"/>
@@ -11688,7 +11688,7 @@
           <a:p>
             <a:pPr lvl="0"/>
             <a:r>
-              <a:rPr lang="en-US" smtClean="0"/>
+              <a:rPr lang="en-US"/>
               <a:t>Click to edit Master text styles</a:t>
             </a:r>
           </a:p>
@@ -11711,7 +11711,7 @@
           <a:p>
             <a:fld id="{1570E9FD-0F47-4482-9939-5478A7A6E089}" type="datetimeFigureOut">
               <a:rPr lang="en-US" smtClean="0"/>
-              <a:t>11/2/2016</a:t>
+              <a:t>2/20/18</a:t>
             </a:fld>
             <a:endParaRPr lang="en-US"/>
           </a:p>
@@ -12606,7 +12606,7 @@
           <a:lstStyle/>
           <a:p>
             <a:r>
-              <a:rPr lang="en-US" smtClean="0"/>
+              <a:rPr lang="en-US"/>
               <a:t>Click to edit Master title style</a:t>
             </a:r>
             <a:endParaRPr lang="en-US" dirty="0"/>
@@ -12640,35 +12640,35 @@
           <a:p>
             <a:pPr lvl="0"/>
             <a:r>
-              <a:rPr lang="en-US" smtClean="0"/>
+              <a:rPr lang="en-US"/>
               <a:t>Click to edit Master text styles</a:t>
             </a:r>
           </a:p>
           <a:p>
             <a:pPr lvl="1"/>
             <a:r>
-              <a:rPr lang="en-US" smtClean="0"/>
+              <a:rPr lang="en-US"/>
               <a:t>Second level</a:t>
             </a:r>
           </a:p>
           <a:p>
             <a:pPr lvl="2"/>
             <a:r>
-              <a:rPr lang="en-US" smtClean="0"/>
+              <a:rPr lang="en-US"/>
               <a:t>Third level</a:t>
             </a:r>
           </a:p>
           <a:p>
             <a:pPr lvl="3"/>
             <a:r>
-              <a:rPr lang="en-US" smtClean="0"/>
+              <a:rPr lang="en-US"/>
               <a:t>Fourth level</a:t>
             </a:r>
           </a:p>
           <a:p>
             <a:pPr lvl="4"/>
             <a:r>
-              <a:rPr lang="en-US" smtClean="0"/>
+              <a:rPr lang="en-US"/>
               <a:t>Fifth level</a:t>
             </a:r>
             <a:endParaRPr lang="en-US" dirty="0"/>
@@ -12708,7 +12708,7 @@
           <a:p>
             <a:fld id="{1570E9FD-0F47-4482-9939-5478A7A6E089}" type="datetimeFigureOut">
               <a:rPr lang="en-US" smtClean="0"/>
-              <a:t>11/2/2016</a:t>
+              <a:t>2/20/18</a:t>
             </a:fld>
             <a:endParaRPr lang="en-US"/>
           </a:p>
@@ -13285,10 +13285,9 @@
           <a:lstStyle/>
           <a:p>
             <a:r>
-              <a:rPr lang="en-US" sz="8800" dirty="0" smtClean="0"/>
+              <a:rPr lang="en-US" sz="8800" dirty="0"/>
               <a:t>The late 1960s</a:t>
             </a:r>
-            <a:endParaRPr lang="en-US" sz="8800" dirty="0"/>
           </a:p>
         </p:txBody>
       </p:sp>
@@ -13310,10 +13309,9 @@
           <a:lstStyle/>
           <a:p>
             <a:r>
-              <a:rPr lang="en-US" sz="4000" dirty="0" smtClean="0"/>
+              <a:rPr lang="en-US" sz="4000" dirty="0"/>
               <a:t>Hope, Violence, Woodstock</a:t>
             </a:r>
-            <a:endParaRPr lang="en-US" sz="4000" dirty="0"/>
           </a:p>
         </p:txBody>
       </p:sp>
@@ -13327,13 +13325,6 @@
   <p:clrMapOvr>
     <a:masterClrMapping/>
   </p:clrMapOvr>
-  <p:timing>
-    <p:tnLst>
-      <p:par>
-        <p:cTn id="1" dur="indefinite" restart="never" nodeType="tmRoot"/>
-      </p:par>
-    </p:tnLst>
-  </p:timing>
 </p:sld>
 </file>
 
@@ -13370,10 +13361,9 @@
           <a:lstStyle/>
           <a:p>
             <a:r>
-              <a:rPr lang="en-US" dirty="0" smtClean="0"/>
+              <a:rPr lang="en-US" dirty="0"/>
               <a:t>Causes of the youthful outburst	</a:t>
             </a:r>
-            <a:endParaRPr lang="en-US" dirty="0"/>
           </a:p>
         </p:txBody>
       </p:sp>
@@ -13400,25 +13390,25 @@
           <a:lstStyle/>
           <a:p>
             <a:r>
-              <a:rPr lang="en-US" sz="3200" dirty="0" smtClean="0"/>
+              <a:rPr lang="en-US" sz="3200" dirty="0"/>
               <a:t>Baby boomers come of age</a:t>
             </a:r>
           </a:p>
           <a:p>
             <a:r>
-              <a:rPr lang="en-US" sz="3200" dirty="0" smtClean="0"/>
+              <a:rPr lang="en-US" sz="3200" dirty="0"/>
               <a:t>Rejection of post-WWII consumerism</a:t>
             </a:r>
           </a:p>
           <a:p>
             <a:r>
-              <a:rPr lang="en-US" sz="3200" dirty="0" smtClean="0"/>
+              <a:rPr lang="en-US" sz="3200" dirty="0"/>
               <a:t>Cold War, 1945-1991</a:t>
             </a:r>
           </a:p>
           <a:p>
             <a:r>
-              <a:rPr lang="en-US" sz="3200" dirty="0" smtClean="0"/>
+              <a:rPr lang="en-US" sz="3200" dirty="0"/>
               <a:t>US Foreign Policy, Korean War, Vietnam War</a:t>
             </a:r>
           </a:p>
@@ -13443,13 +13433,6 @@
   <p:clrMapOvr>
     <a:masterClrMapping/>
   </p:clrMapOvr>
-  <p:timing>
-    <p:tnLst>
-      <p:par>
-        <p:cTn id="1" dur="indefinite" restart="never" nodeType="tmRoot"/>
-      </p:par>
-    </p:tnLst>
-  </p:timing>
 </p:sld>
 </file>
 
@@ -13486,10 +13469,9 @@
           <a:lstStyle/>
           <a:p>
             <a:r>
-              <a:rPr lang="en-US" sz="5400" dirty="0" smtClean="0"/>
+              <a:rPr lang="en-US" sz="5400" dirty="0"/>
               <a:t>Vietnam War, 1955-1975</a:t>
             </a:r>
-            <a:endParaRPr lang="en-US" sz="5400" dirty="0"/>
           </a:p>
         </p:txBody>
       </p:sp>
@@ -13516,27 +13498,19 @@
           <a:lstStyle/>
           <a:p>
             <a:r>
-              <a:rPr lang="en-US" sz="2400" dirty="0" smtClean="0"/>
-              <a:t>In north Vietnam: Resistance </a:t>
-            </a:r>
-            <a:r>
               <a:rPr lang="en-US" sz="2400" dirty="0"/>
-              <a:t>War Against </a:t>
-            </a:r>
-            <a:r>
-              <a:rPr lang="en-US" sz="2400" dirty="0" smtClean="0"/>
-              <a:t>America</a:t>
-            </a:r>
-          </a:p>
-          <a:p>
-            <a:r>
-              <a:rPr lang="en-US" sz="2400" dirty="0" smtClean="0"/>
+              <a:t>In north Vietnam: Resistance War Against America</a:t>
+            </a:r>
+          </a:p>
+          <a:p>
+            <a:r>
+              <a:rPr lang="en-US" sz="2400" dirty="0"/>
               <a:t>Communist forces: North Vietnam, China, Viet Cong, Khmer Rouge, Soviet Union, North Korea, Cuba</a:t>
             </a:r>
           </a:p>
           <a:p>
             <a:r>
-              <a:rPr lang="en-US" sz="2400" dirty="0" smtClean="0"/>
+              <a:rPr lang="en-US" sz="2400" dirty="0"/>
               <a:t>Anti-Communist forces: South Vietnam, USA, South Korea, Thailand, Australia.</a:t>
             </a:r>
           </a:p>
@@ -13562,7 +13536,7 @@
             <a:pPr marL="0" indent="0">
               <a:buNone/>
             </a:pPr>
-            <a:endParaRPr lang="en-US" sz="2400" dirty="0" smtClean="0"/>
+            <a:endParaRPr lang="en-US" sz="2400" dirty="0"/>
           </a:p>
         </p:txBody>
       </p:sp>
@@ -13576,13 +13550,6 @@
   <p:clrMapOvr>
     <a:masterClrMapping/>
   </p:clrMapOvr>
-  <p:timing>
-    <p:tnLst>
-      <p:par>
-        <p:cTn id="1" dur="indefinite" restart="never" nodeType="tmRoot"/>
-      </p:par>
-    </p:tnLst>
-  </p:timing>
 </p:sld>
 </file>
 
@@ -13619,10 +13586,9 @@
           <a:lstStyle/>
           <a:p>
             <a:r>
-              <a:rPr lang="en-US" sz="5400" dirty="0" smtClean="0"/>
+              <a:rPr lang="en-US" sz="5400" dirty="0"/>
               <a:t>Vietnam War, 1955-1975</a:t>
             </a:r>
-            <a:endParaRPr lang="en-US" sz="5400" dirty="0"/>
           </a:p>
         </p:txBody>
       </p:sp>
@@ -13649,46 +13615,45 @@
           <a:lstStyle/>
           <a:p>
             <a:r>
-              <a:rPr lang="en-US" sz="2000" dirty="0" smtClean="0"/>
+              <a:rPr lang="en-US" sz="2000" dirty="0"/>
               <a:t>President Lyndon Johnson given full powers to deploy “conventional” forces in southeast Asia.</a:t>
             </a:r>
           </a:p>
           <a:p>
             <a:r>
-              <a:rPr lang="en-US" sz="2000" dirty="0" smtClean="0"/>
+              <a:rPr lang="en-US" sz="2000" dirty="0"/>
               <a:t>Containment of communism, but far away, and many youths not really willing to fight.</a:t>
             </a:r>
           </a:p>
           <a:p>
             <a:r>
-              <a:rPr lang="en-US" sz="2000" dirty="0" smtClean="0"/>
+              <a:rPr lang="en-US" sz="2000" dirty="0"/>
               <a:t>Peace movement also played a role.</a:t>
             </a:r>
           </a:p>
           <a:p>
             <a:r>
-              <a:rPr lang="en-US" sz="2000" dirty="0" smtClean="0"/>
+              <a:rPr lang="en-US" sz="2000" dirty="0"/>
               <a:t>Napalm bombing</a:t>
             </a:r>
           </a:p>
           <a:p>
             <a:r>
-              <a:rPr lang="en-US" sz="2000" dirty="0" smtClean="0"/>
+              <a:rPr lang="en-US" sz="2000" dirty="0"/>
               <a:t>War crimes (both sides, but in west US war crimes got most press).</a:t>
             </a:r>
           </a:p>
           <a:p>
             <a:r>
-              <a:rPr lang="en-US" sz="2000" dirty="0" smtClean="0"/>
+              <a:rPr lang="en-US" sz="2000" dirty="0"/>
               <a:t>Tet Offensive, February 1968</a:t>
             </a:r>
           </a:p>
           <a:p>
             <a:r>
-              <a:rPr lang="en-US" sz="2000" dirty="0" smtClean="0"/>
+              <a:rPr lang="en-US" sz="2000" dirty="0"/>
               <a:t>Most famously: My Lai massacre, March 1968.</a:t>
             </a:r>
-            <a:endParaRPr lang="en-US" sz="2000" dirty="0"/>
           </a:p>
         </p:txBody>
       </p:sp>
@@ -13702,13 +13667,6 @@
   <p:clrMapOvr>
     <a:masterClrMapping/>
   </p:clrMapOvr>
-  <p:timing>
-    <p:tnLst>
-      <p:par>
-        <p:cTn id="1" dur="indefinite" restart="never" nodeType="tmRoot"/>
-      </p:par>
-    </p:tnLst>
-  </p:timing>
 </p:sld>
 </file>
 
@@ -13745,10 +13703,9 @@
           <a:lstStyle/>
           <a:p>
             <a:r>
-              <a:rPr lang="en-US" dirty="0" smtClean="0"/>
+              <a:rPr lang="en-US" dirty="0"/>
               <a:t>Anti-War Protests</a:t>
             </a:r>
-            <a:endParaRPr lang="en-US" dirty="0"/>
           </a:p>
         </p:txBody>
       </p:sp>
@@ -13764,8 +13721,8 @@
         </p:nvSpPr>
         <p:spPr>
           <a:xfrm>
-            <a:off x="746975" y="2562897"/>
-            <a:ext cx="10844011" cy="4005328"/>
+            <a:off x="709127" y="2351314"/>
+            <a:ext cx="10881859" cy="4216911"/>
           </a:xfrm>
         </p:spPr>
         <p:txBody>
@@ -13784,41 +13741,46 @@
             </a:r>
             <a:r>
               <a:rPr lang="en-US" b="1" dirty="0"/>
-              <a:t> </a:t>
-            </a:r>
-            <a:r>
-              <a:rPr lang="en-US" b="1" dirty="0" smtClean="0"/>
-              <a:t>(1882 </a:t>
+              <a:t> (1882 – March 26, 1965), inspired by Buddhist nuns and monks’ self-</a:t>
+            </a:r>
+            <a:r>
+              <a:rPr lang="en-US" b="1" dirty="0" err="1"/>
+              <a:t>emolations</a:t>
             </a:r>
             <a:r>
               <a:rPr lang="en-US" b="1" dirty="0"/>
-              <a:t>– March 26, 1965</a:t>
-            </a:r>
-            <a:r>
-              <a:rPr lang="en-US" b="1" dirty="0" smtClean="0"/>
-              <a:t>)</a:t>
-            </a:r>
-          </a:p>
-          <a:p>
-            <a:r>
-              <a:rPr lang="en-US" b="1" dirty="0" smtClean="0"/>
+              <a:t>.</a:t>
+            </a:r>
+          </a:p>
+          <a:p>
+            <a:r>
+              <a:rPr lang="en-US" b="1" dirty="0"/>
               <a:t>Norman Morrison (2 Nov 1965): Quaker, emulated himself in front of Robert McNamara’s office window, 2 November 1965.</a:t>
             </a:r>
           </a:p>
           <a:p>
             <a:r>
-              <a:rPr lang="en-US" b="1" dirty="0" smtClean="0"/>
+              <a:rPr lang="en-US" b="1" dirty="0"/>
+              <a:t>There were numerous others: </a:t>
+            </a:r>
+            <a:r>
+              <a:rPr lang="en-US" b="1" dirty="0">
+                <a:hlinkClick r:id="rId2"/>
+              </a:rPr>
+              <a:t>link</a:t>
+            </a:r>
+            <a:endParaRPr lang="en-US" b="1" dirty="0"/>
+          </a:p>
+          <a:p>
+            <a:r>
+              <a:rPr lang="en-US" b="1" dirty="0"/>
               <a:t>Students burned draft cards.</a:t>
             </a:r>
           </a:p>
           <a:p>
             <a:r>
-              <a:rPr lang="en-US" b="1" dirty="0" smtClean="0"/>
-              <a:t>Fled to Canada: “The</a:t>
-            </a:r>
-            <a:r>
               <a:rPr lang="en-US" b="1" dirty="0"/>
-              <a:t> </a:t>
+              <a:t>Fled to Canada: “The </a:t>
             </a:r>
             <a:r>
               <a:rPr lang="en-US" b="1" i="1" dirty="0"/>
@@ -13834,46 +13796,13 @@
             </a:r>
             <a:r>
               <a:rPr lang="en-US" b="1" dirty="0"/>
-              <a:t> and the House of Anansi Press, sold nearly 100,000 </a:t>
-            </a:r>
-            <a:r>
-              <a:rPr lang="en-US" b="1" dirty="0" smtClean="0"/>
-              <a:t>copies.”</a:t>
+              <a:t> and the House of Anansi Press, sold nearly 100,000 copies.”</a:t>
             </a:r>
           </a:p>
           <a:p>
             <a:r>
               <a:rPr lang="en-US" b="1" dirty="0"/>
               <a:t>Street demonstrations: </a:t>
-            </a:r>
-            <a:endParaRPr lang="en-US" b="1" dirty="0" smtClean="0"/>
-          </a:p>
-          <a:p>
-            <a:pPr lvl="1"/>
-            <a:r>
-              <a:rPr lang="en-US" sz="1800" b="1" dirty="0" smtClean="0">
-                <a:hlinkClick r:id="rId2"/>
-              </a:rPr>
-              <a:t>https</a:t>
-            </a:r>
-            <a:r>
-              <a:rPr lang="en-US" sz="1800" b="1" dirty="0">
-                <a:hlinkClick r:id="rId2"/>
-              </a:rPr>
-              <a:t>://</a:t>
-            </a:r>
-            <a:r>
-              <a:rPr lang="en-US" sz="1800" b="1" dirty="0" smtClean="0">
-                <a:hlinkClick r:id="rId2"/>
-              </a:rPr>
-              <a:t>www.youtube.com/watch?v=yMNX6zyAmGs</a:t>
-            </a:r>
-            <a:endParaRPr lang="en-US" sz="1800" b="1" dirty="0" smtClean="0"/>
-          </a:p>
-          <a:p>
-            <a:r>
-              <a:rPr lang="en-US" b="1" dirty="0" smtClean="0"/>
-              <a:t>Phil Ochs, “Draft Dodger Rag,” 1965:</a:t>
             </a:r>
           </a:p>
           <a:p>
@@ -13882,15 +13811,25 @@
               <a:rPr lang="en-US" sz="1800" b="1" dirty="0">
                 <a:hlinkClick r:id="rId3"/>
               </a:rPr>
-              <a:t>https://</a:t>
-            </a:r>
-            <a:r>
-              <a:rPr lang="en-US" sz="1800" b="1" dirty="0" smtClean="0">
-                <a:hlinkClick r:id="rId3"/>
+              <a:t>https://www.youtube.com/watch?v=yMNX6zyAmGs</a:t>
+            </a:r>
+            <a:endParaRPr lang="en-US" sz="1800" b="1" dirty="0"/>
+          </a:p>
+          <a:p>
+            <a:r>
+              <a:rPr lang="en-US" b="1" dirty="0"/>
+              <a:t>Phil Ochs, “Draft Dodger Rag,” 1965:</a:t>
+            </a:r>
+          </a:p>
+          <a:p>
+            <a:pPr lvl="1"/>
+            <a:r>
+              <a:rPr lang="en-US" sz="1800" b="1" dirty="0">
+                <a:hlinkClick r:id="rId4"/>
               </a:rPr>
-              <a:t>www.youtube.com/watch?v=vlTf9fp07sw</a:t>
-            </a:r>
-            <a:endParaRPr lang="en-US" sz="1800" b="1" dirty="0" smtClean="0"/>
+              <a:t>https://www.youtube.com/watch?v=vlTf9fp07sw</a:t>
+            </a:r>
+            <a:endParaRPr lang="en-US" sz="1800" b="1" dirty="0"/>
           </a:p>
         </p:txBody>
       </p:sp>
@@ -13904,13 +13843,6 @@
   <p:clrMapOvr>
     <a:masterClrMapping/>
   </p:clrMapOvr>
-  <p:timing>
-    <p:tnLst>
-      <p:par>
-        <p:cTn id="1" dur="indefinite" restart="never" nodeType="tmRoot"/>
-      </p:par>
-    </p:tnLst>
-  </p:timing>
 </p:sld>
 </file>
 
@@ -13947,10 +13879,9 @@
           <a:lstStyle/>
           <a:p>
             <a:r>
-              <a:rPr lang="en-US" dirty="0" smtClean="0"/>
+              <a:rPr lang="en-US" dirty="0"/>
               <a:t>Protest Music</a:t>
             </a:r>
-            <a:endParaRPr lang="en-US" dirty="0"/>
           </a:p>
         </p:txBody>
       </p:sp>
@@ -13977,48 +13908,31 @@
           <a:lstStyle/>
           <a:p>
             <a:r>
-              <a:rPr lang="en-US" sz="2000" dirty="0" smtClean="0"/>
-              <a:t>Arlo Guthrie, “Alice’s Restaurant,” 1967</a:t>
-            </a:r>
-          </a:p>
-          <a:p>
-            <a:pPr lvl="1"/>
-            <a:r>
               <a:rPr lang="en-US" sz="2000" dirty="0"/>
-              <a:t>https://www.youtube.com/watch?v=zPx2t7xoF1k</a:t>
-            </a:r>
-            <a:endParaRPr lang="en-US" sz="2000" dirty="0" smtClean="0"/>
-          </a:p>
-          <a:p>
-            <a:r>
-              <a:rPr lang="en-US" sz="2000" dirty="0" smtClean="0"/>
-              <a:t>Buffalo Springfield, “For what it’s worth,” 1967</a:t>
-            </a:r>
-          </a:p>
-          <a:p>
-            <a:pPr lvl="1"/>
+              <a:t>Arlo Guthrie, “Alice’s Restaurant,” 1967 (</a:t>
+            </a:r>
             <a:r>
               <a:rPr lang="en-US" sz="2000" dirty="0">
                 <a:hlinkClick r:id="rId2"/>
               </a:rPr>
-              <a:t>https://</a:t>
-            </a:r>
-            <a:r>
-              <a:rPr lang="en-US" sz="2000" dirty="0" smtClean="0">
-                <a:hlinkClick r:id="rId2"/>
-              </a:rPr>
-              <a:t>www.youtube.com/watch?v=gp5JCrSXkJY&amp;index=8&amp;list=PL737EFE1E7CBF4B4E</a:t>
-            </a:r>
-            <a:endParaRPr lang="en-US" sz="2000" dirty="0" smtClean="0"/>
-          </a:p>
-          <a:p>
-            <a:r>
-              <a:rPr lang="en-US" sz="2000" dirty="0" err="1" smtClean="0"/>
-              <a:t>Creedence</a:t>
-            </a:r>
-            <a:r>
-              <a:rPr lang="en-US" sz="2000" dirty="0" smtClean="0"/>
-              <a:t> Clearwater Revival, “Fortunate Son,” 1969</a:t>
+              <a:t>link</a:t>
+            </a:r>
+            <a:r>
+              <a:rPr lang="en-US" sz="2000" dirty="0"/>
+              <a:t>)</a:t>
+            </a:r>
+          </a:p>
+          <a:p>
+            <a:pPr lvl="1"/>
+            <a:r>
+              <a:rPr lang="en-US" sz="2000" dirty="0"/>
+              <a:t>https://www.youtube.com/watch?v=zPx2t7xoF1k</a:t>
+            </a:r>
+          </a:p>
+          <a:p>
+            <a:r>
+              <a:rPr lang="en-US" sz="2000" dirty="0"/>
+              <a:t>Buffalo Springfield, “For what it’s worth,” 1967</a:t>
             </a:r>
           </a:p>
           <a:p>
@@ -14027,39 +13941,53 @@
               <a:rPr lang="en-US" sz="2000" dirty="0">
                 <a:hlinkClick r:id="rId3"/>
               </a:rPr>
-              <a:t>https://</a:t>
-            </a:r>
-            <a:r>
-              <a:rPr lang="en-US" sz="2000" dirty="0" smtClean="0">
-                <a:hlinkClick r:id="rId3"/>
+              <a:t>https://www.youtube.com/watch?v=gp5JCrSXkJY&amp;index=8&amp;list=PL737EFE1E7CBF4B4E</a:t>
+            </a:r>
+            <a:endParaRPr lang="en-US" sz="2000" dirty="0"/>
+          </a:p>
+          <a:p>
+            <a:r>
+              <a:rPr lang="en-US" sz="2000" dirty="0" err="1"/>
+              <a:t>Creedence</a:t>
+            </a:r>
+            <a:r>
+              <a:rPr lang="en-US" sz="2000" dirty="0"/>
+              <a:t> Clearwater Revival, “Fortunate Son,” 1969</a:t>
+            </a:r>
+          </a:p>
+          <a:p>
+            <a:pPr lvl="1"/>
+            <a:r>
+              <a:rPr lang="en-US" sz="2000" dirty="0">
+                <a:hlinkClick r:id="rId4"/>
               </a:rPr>
-              <a:t>www.youtube.com/watch?v=f33qUqdZapw</a:t>
-            </a:r>
-            <a:endParaRPr lang="en-US" sz="2000" dirty="0" smtClean="0"/>
-          </a:p>
-          <a:p>
-            <a:r>
-              <a:rPr lang="en-US" sz="2000" dirty="0" smtClean="0"/>
+              <a:t>https://www.youtube.com/watch?v=f33qUqdZapw</a:t>
+            </a:r>
+            <a:endParaRPr lang="en-US" sz="2000" dirty="0"/>
+          </a:p>
+          <a:p>
+            <a:r>
+              <a:rPr lang="en-US" sz="2000" dirty="0"/>
               <a:t>Jefferson Airplane, “Volunteers,” 1969</a:t>
             </a:r>
           </a:p>
           <a:p>
             <a:r>
-              <a:rPr lang="en-US" sz="2000" dirty="0" smtClean="0"/>
+              <a:rPr lang="en-US" sz="2000" dirty="0"/>
               <a:t>Martha and the </a:t>
             </a:r>
             <a:r>
-              <a:rPr lang="en-US" sz="2000" dirty="0" err="1" smtClean="0"/>
+              <a:rPr lang="en-US" sz="2000" dirty="0" err="1"/>
               <a:t>Vandelas</a:t>
             </a:r>
             <a:r>
-              <a:rPr lang="en-US" sz="2000" dirty="0" smtClean="0"/>
+              <a:rPr lang="en-US" sz="2000" dirty="0"/>
               <a:t>, “I should be proud,” 1970</a:t>
             </a:r>
           </a:p>
           <a:p>
             <a:r>
-              <a:rPr lang="en-US" sz="2000" dirty="0" smtClean="0"/>
+              <a:rPr lang="en-US" sz="2000" dirty="0"/>
               <a:t>Edwin Starr, “War,” 1970</a:t>
             </a:r>
           </a:p>
@@ -14078,13 +14006,6 @@
   <p:clrMapOvr>
     <a:masterClrMapping/>
   </p:clrMapOvr>
-  <p:timing>
-    <p:tnLst>
-      <p:par>
-        <p:cTn id="1" dur="indefinite" restart="never" nodeType="tmRoot"/>
-      </p:par>
-    </p:tnLst>
-  </p:timing>
 </p:sld>
 </file>
 
@@ -14121,10 +14042,9 @@
           <a:lstStyle/>
           <a:p>
             <a:r>
-              <a:rPr lang="en-US" dirty="0" smtClean="0"/>
+              <a:rPr lang="en-US" dirty="0"/>
               <a:t>The Rock Concert</a:t>
             </a:r>
-            <a:endParaRPr lang="en-US" dirty="0"/>
           </a:p>
         </p:txBody>
       </p:sp>
@@ -14151,12 +14071,8 @@
           <a:lstStyle/>
           <a:p>
             <a:r>
-              <a:rPr lang="en-US" sz="2000" dirty="0" smtClean="0"/>
-              <a:t>Authorities did not like them from the start: Alan Freed, </a:t>
-            </a:r>
-            <a:r>
               <a:rPr lang="en-US" sz="2000" dirty="0"/>
-              <a:t>21 March 1952: “</a:t>
+              <a:t>Authorities did not like them from the start: Alan Freed, 21 March 1952: “</a:t>
             </a:r>
             <a:r>
               <a:rPr lang="en-US" sz="2000" dirty="0" err="1"/>
@@ -14164,86 +14080,48 @@
             </a:r>
             <a:r>
               <a:rPr lang="en-US" sz="2000" dirty="0"/>
-              <a:t> Coronation Ball</a:t>
-            </a:r>
-            <a:r>
-              <a:rPr lang="en-US" sz="2000" dirty="0" smtClean="0"/>
-              <a:t>”: desegregated, but also 20,000 tickets sold.</a:t>
-            </a:r>
-          </a:p>
-          <a:p>
-            <a:r>
-              <a:rPr lang="en-US" sz="2000" dirty="0" smtClean="0"/>
+              <a:t> Coronation Ball”: desegregated, but also 20,000 tickets sold.</a:t>
+            </a:r>
+          </a:p>
+          <a:p>
+            <a:r>
+              <a:rPr lang="en-US" sz="2000" dirty="0"/>
               <a:t>Rock Concert versus playing at a club: Keith Richards about Mick Jagger</a:t>
             </a:r>
           </a:p>
           <a:p>
             <a:r>
-              <a:rPr lang="en-US" sz="2000" dirty="0" smtClean="0"/>
-              <a:t>Rock Festival: in </a:t>
-            </a:r>
-            <a:r>
-              <a:rPr lang="en-US" sz="2000" dirty="0" smtClean="0"/>
-              <a:t>Europe, grew </a:t>
-            </a:r>
-            <a:r>
-              <a:rPr lang="en-US" sz="2000" dirty="0" smtClean="0"/>
-              <a:t>out of Jazz </a:t>
-            </a:r>
-            <a:r>
-              <a:rPr lang="en-US" sz="2000" dirty="0" smtClean="0"/>
-              <a:t>festivals.</a:t>
-            </a:r>
-            <a:endParaRPr lang="en-US" sz="2000" dirty="0" smtClean="0"/>
-          </a:p>
-          <a:p>
-            <a:r>
-              <a:rPr lang="en-US" sz="2000" b="1" dirty="0" smtClean="0"/>
-              <a:t>USA, summer 1967: </a:t>
-            </a:r>
+              <a:rPr lang="en-US" sz="2000" dirty="0"/>
+              <a:t>Rock Festival: in Europe, grew out of Jazz festivals.</a:t>
+            </a:r>
+          </a:p>
+          <a:p>
             <a:r>
               <a:rPr lang="en-US" sz="2000" b="1" dirty="0"/>
-              <a:t> </a:t>
-            </a:r>
-          </a:p>
-          <a:p>
-            <a:r>
-              <a:rPr lang="en-US" sz="2000" dirty="0" smtClean="0"/>
-              <a:t>KFRC</a:t>
-            </a:r>
+              <a:t>USA, summer 1967:  </a:t>
+            </a:r>
+          </a:p>
+          <a:p>
             <a:r>
               <a:rPr lang="en-US" sz="2000" dirty="0"/>
-              <a:t> Fantasy Fair &amp; Magic Mountain Music Festival on Mount Tamalpais (June </a:t>
-            </a:r>
-            <a:r>
-              <a:rPr lang="en-US" sz="2000" dirty="0" smtClean="0"/>
-              <a:t>10–11)</a:t>
-            </a:r>
-          </a:p>
-          <a:p>
-            <a:r>
-              <a:rPr lang="en-US" sz="2000" b="1" dirty="0" smtClean="0"/>
-              <a:t>Monterey </a:t>
-            </a:r>
+              <a:t>KFRC Fantasy Fair &amp; Magic Mountain Music Festival on Mount Tamalpais (June 10–11)</a:t>
+            </a:r>
+          </a:p>
+          <a:p>
             <a:r>
               <a:rPr lang="en-US" sz="2000" b="1" dirty="0"/>
-              <a:t>International Pop Festival (June </a:t>
-            </a:r>
-            <a:r>
-              <a:rPr lang="en-US" sz="2000" b="1" dirty="0" smtClean="0"/>
-              <a:t>16–17): </a:t>
-            </a:r>
-            <a:r>
-              <a:rPr lang="en-US" sz="2000" dirty="0" smtClean="0"/>
+              <a:t>Monterey International Pop Festival (June 16–17): </a:t>
+            </a:r>
+            <a:r>
+              <a:rPr lang="en-US" sz="2000" dirty="0"/>
               <a:t>Jimi Hendrix, Janis Joplin, The Who, and Otis Redding; Jefferson Airplane, Mamas and the Papas.</a:t>
             </a:r>
           </a:p>
           <a:p>
             <a:r>
-              <a:rPr lang="en-US" sz="2000" dirty="0" smtClean="0"/>
+              <a:rPr lang="en-US" sz="2000" dirty="0"/>
               <a:t>Sparked “Summer of Love”</a:t>
             </a:r>
-            <a:endParaRPr lang="en-US" sz="2000" dirty="0"/>
           </a:p>
           <a:p>
             <a:endParaRPr lang="en-US" sz="2000" dirty="0"/>
@@ -14260,13 +14138,6 @@
   <p:clrMapOvr>
     <a:masterClrMapping/>
   </p:clrMapOvr>
-  <p:timing>
-    <p:tnLst>
-      <p:par>
-        <p:cTn id="1" dur="indefinite" restart="never" nodeType="tmRoot"/>
-      </p:par>
-    </p:tnLst>
-  </p:timing>
 </p:sld>
 </file>
 
@@ -14303,10 +14174,9 @@
           <a:lstStyle/>
           <a:p>
             <a:r>
-              <a:rPr lang="en-US" dirty="0" smtClean="0"/>
+              <a:rPr lang="en-US" dirty="0"/>
               <a:t>Woodstock Music and Art Fair, </a:t>
             </a:r>
-            <a:endParaRPr lang="en-US" dirty="0"/>
           </a:p>
         </p:txBody>
       </p:sp>
@@ -14331,62 +14201,62 @@
           <a:lstStyle/>
           <a:p>
             <a:r>
-              <a:rPr lang="en-US" dirty="0" smtClean="0"/>
+              <a:rPr lang="en-US" dirty="0"/>
               <a:t>White Lake/Bethel, NY, 15-18 August 1969: Three Days of Peace and Music</a:t>
             </a:r>
           </a:p>
           <a:p>
             <a:r>
-              <a:rPr lang="en-US" dirty="0" smtClean="0"/>
+              <a:rPr lang="en-US" dirty="0"/>
               <a:t>186,000 advance tickets sold ($18 each).</a:t>
             </a:r>
           </a:p>
           <a:p>
             <a:r>
-              <a:rPr lang="en-US" dirty="0" smtClean="0"/>
+              <a:rPr lang="en-US" dirty="0"/>
               <a:t>Banned from initial site, which promoted festival.</a:t>
             </a:r>
           </a:p>
           <a:p>
             <a:r>
-              <a:rPr lang="en-US" dirty="0" smtClean="0"/>
+              <a:rPr lang="en-US" dirty="0"/>
               <a:t>Max </a:t>
             </a:r>
             <a:r>
-              <a:rPr lang="en-US" dirty="0" err="1" smtClean="0"/>
+              <a:rPr lang="en-US" dirty="0" err="1"/>
               <a:t>Yasgur’s</a:t>
             </a:r>
             <a:r>
-              <a:rPr lang="en-US" dirty="0" smtClean="0"/>
+              <a:rPr lang="en-US" dirty="0"/>
               <a:t> milk farm formed the bowl.</a:t>
             </a:r>
           </a:p>
           <a:p>
             <a:r>
-              <a:rPr lang="en-US" dirty="0" smtClean="0"/>
+              <a:rPr lang="en-US" dirty="0"/>
               <a:t>Late change of site left no time to prepare: stage or fence; chose stage.</a:t>
             </a:r>
           </a:p>
           <a:p>
             <a:r>
-              <a:rPr lang="en-US" dirty="0" smtClean="0"/>
+              <a:rPr lang="en-US" dirty="0"/>
               <a:t>About 500,000 showed up.</a:t>
             </a:r>
           </a:p>
           <a:p>
             <a:r>
-              <a:rPr lang="en-US" dirty="0" smtClean="0"/>
+              <a:rPr lang="en-US" dirty="0"/>
               <a:t>Two deaths, two births, lots of rain.</a:t>
             </a:r>
           </a:p>
           <a:p>
             <a:r>
-              <a:rPr lang="en-US" dirty="0" smtClean="0"/>
+              <a:rPr lang="en-US" dirty="0"/>
               <a:t>Hendrix closed on Monday morning, as people straggled home.</a:t>
             </a:r>
           </a:p>
           <a:p>
-            <a:endParaRPr lang="en-US" dirty="0" smtClean="0"/>
+            <a:endParaRPr lang="en-US" dirty="0"/>
           </a:p>
           <a:p>
             <a:endParaRPr lang="en-US" dirty="0"/>
@@ -14433,13 +14303,6 @@
   <p:clrMapOvr>
     <a:masterClrMapping/>
   </p:clrMapOvr>
-  <p:timing>
-    <p:tnLst>
-      <p:par>
-        <p:cTn id="1" dur="indefinite" restart="never" nodeType="tmRoot"/>
-      </p:par>
-    </p:tnLst>
-  </p:timing>
 </p:sld>
 </file>
 
@@ -14476,10 +14339,9 @@
           <a:lstStyle/>
           <a:p>
             <a:r>
-              <a:rPr lang="en-US" dirty="0" smtClean="0"/>
+              <a:rPr lang="en-US" dirty="0"/>
               <a:t>Performers’ paychecks!</a:t>
             </a:r>
-            <a:endParaRPr lang="en-US" dirty="0"/>
           </a:p>
         </p:txBody>
       </p:sp>
@@ -14507,54 +14369,20 @@
           <a:p>
             <a:r>
               <a:rPr lang="en-US" sz="2000" dirty="0"/>
-              <a:t>Jimi </a:t>
-            </a:r>
-            <a:r>
-              <a:rPr lang="en-US" sz="2000" dirty="0" smtClean="0"/>
-              <a:t>Hendrix: $30,000 </a:t>
-            </a:r>
+              <a:t>Jimi Hendrix: $30,000 for two sets (plus $2,000 for expenses)</a:t>
+            </a:r>
+          </a:p>
+          <a:p>
             <a:r>
               <a:rPr lang="en-US" sz="2000" dirty="0"/>
-              <a:t>for two sets </a:t>
-            </a:r>
-            <a:r>
-              <a:rPr lang="en-US" sz="2000" dirty="0" smtClean="0"/>
-              <a:t>(plus </a:t>
-            </a:r>
+              <a:t>Blood, Sweat &amp; Tears: $15,000</a:t>
+            </a:r>
+          </a:p>
+          <a:p>
             <a:r>
               <a:rPr lang="en-US" sz="2000" dirty="0"/>
-              <a:t>$2,000 for </a:t>
-            </a:r>
-            <a:r>
-              <a:rPr lang="en-US" sz="2000" dirty="0" smtClean="0"/>
-              <a:t>expenses)</a:t>
-            </a:r>
-          </a:p>
-          <a:p>
-            <a:r>
-              <a:rPr lang="en-US" sz="2000" dirty="0" smtClean="0"/>
-              <a:t>Blood</a:t>
-            </a:r>
-            <a:r>
-              <a:rPr lang="en-US" sz="2000" dirty="0"/>
-              <a:t>, Sweat &amp; </a:t>
-            </a:r>
-            <a:r>
-              <a:rPr lang="en-US" sz="2000" dirty="0" smtClean="0"/>
-              <a:t>Tears: $15,000</a:t>
-            </a:r>
-            <a:endParaRPr lang="en-US" sz="2000" dirty="0"/>
-          </a:p>
-          <a:p>
-            <a:r>
-              <a:rPr lang="en-US" sz="2000" dirty="0"/>
-              <a:t>Joan </a:t>
-            </a:r>
-            <a:r>
-              <a:rPr lang="en-US" sz="2000" dirty="0" smtClean="0"/>
-              <a:t>Baez: $10,000</a:t>
-            </a:r>
-            <a:endParaRPr lang="en-US" sz="2000" dirty="0"/>
+              <a:t>Joan Baez: $10,000</a:t>
+            </a:r>
           </a:p>
           <a:p>
             <a:r>
@@ -14563,57 +14391,32 @@
             </a:r>
             <a:r>
               <a:rPr lang="en-US" sz="2000" dirty="0"/>
-              <a:t> Clearwater </a:t>
-            </a:r>
-            <a:r>
-              <a:rPr lang="en-US" sz="2000" dirty="0" smtClean="0"/>
-              <a:t>Revival: $10,000</a:t>
-            </a:r>
-            <a:endParaRPr lang="en-US" sz="2000" dirty="0"/>
+              <a:t> Clearwater Revival: $10,000</a:t>
+            </a:r>
           </a:p>
           <a:p>
             <a:r>
               <a:rPr lang="en-US" sz="2000" dirty="0"/>
-              <a:t>The </a:t>
-            </a:r>
-            <a:r>
-              <a:rPr lang="en-US" sz="2000" dirty="0" smtClean="0"/>
-              <a:t>Band: $7,500</a:t>
-            </a:r>
-            <a:endParaRPr lang="en-US" sz="2000" dirty="0"/>
+              <a:t>The Band: $7,500</a:t>
+            </a:r>
           </a:p>
           <a:p>
             <a:r>
               <a:rPr lang="en-US" sz="2000" dirty="0"/>
-              <a:t>Janis </a:t>
-            </a:r>
-            <a:r>
-              <a:rPr lang="en-US" sz="2000" dirty="0" smtClean="0"/>
-              <a:t>Joplin: $7,500</a:t>
-            </a:r>
-            <a:endParaRPr lang="en-US" sz="2000" dirty="0"/>
+              <a:t>Janis Joplin: $7,500</a:t>
+            </a:r>
           </a:p>
           <a:p>
             <a:r>
               <a:rPr lang="en-US" sz="2000" dirty="0"/>
-              <a:t>Jefferson </a:t>
-            </a:r>
-            <a:r>
-              <a:rPr lang="en-US" sz="2000" dirty="0" smtClean="0"/>
-              <a:t>Airplane: $7,500</a:t>
-            </a:r>
-            <a:endParaRPr lang="en-US" sz="2000" dirty="0"/>
+              <a:t>Jefferson Airplane: $7,500</a:t>
+            </a:r>
           </a:p>
           <a:p>
             <a:r>
               <a:rPr lang="en-US" sz="2000" dirty="0"/>
-              <a:t>Sly and the Family </a:t>
-            </a:r>
-            <a:r>
-              <a:rPr lang="en-US" sz="2000" dirty="0" smtClean="0"/>
-              <a:t>Stone: $7,000</a:t>
-            </a:r>
-            <a:endParaRPr lang="en-US" sz="2000" dirty="0"/>
+              <a:t>Sly and the Family Stone: $7,000</a:t>
+            </a:r>
           </a:p>
           <a:p>
             <a:endParaRPr lang="en-US" sz="2000" dirty="0"/>
@@ -14651,13 +14454,8 @@
             </a:pPr>
             <a:r>
               <a:rPr lang="en-US" sz="2000" dirty="0"/>
-              <a:t>Canned </a:t>
-            </a:r>
-            <a:r>
-              <a:rPr lang="en-US" sz="2000" dirty="0" smtClean="0"/>
-              <a:t>Heat: $6,500</a:t>
-            </a:r>
-            <a:endParaRPr lang="en-US" sz="2000" dirty="0"/>
+              <a:t>Canned Heat: $6,500</a:t>
+            </a:r>
           </a:p>
           <a:p>
             <a:pPr marL="285750" indent="-285750">
@@ -14666,13 +14464,8 @@
             </a:pPr>
             <a:r>
               <a:rPr lang="en-US" sz="2000" dirty="0"/>
-              <a:t>The </a:t>
-            </a:r>
-            <a:r>
-              <a:rPr lang="en-US" sz="2000" dirty="0" smtClean="0"/>
-              <a:t>Who: $6,250</a:t>
-            </a:r>
-            <a:endParaRPr lang="en-US" sz="2000" dirty="0"/>
+              <a:t>The Who: $6,250</a:t>
+            </a:r>
           </a:p>
           <a:p>
             <a:pPr marL="285750" indent="-285750">
@@ -14681,13 +14474,8 @@
             </a:pPr>
             <a:r>
               <a:rPr lang="en-US" sz="2000" dirty="0"/>
-              <a:t>Richie </a:t>
-            </a:r>
-            <a:r>
-              <a:rPr lang="en-US" sz="2000" dirty="0" smtClean="0"/>
-              <a:t>Havens: $6,000</a:t>
-            </a:r>
-            <a:endParaRPr lang="en-US" sz="2000" dirty="0"/>
+              <a:t>Richie Havens: $6,000</a:t>
+            </a:r>
           </a:p>
           <a:p>
             <a:pPr marL="285750" indent="-285750">
@@ -14696,13 +14484,8 @@
             </a:pPr>
             <a:r>
               <a:rPr lang="en-US" sz="2000" dirty="0"/>
-              <a:t>Arlo </a:t>
-            </a:r>
-            <a:r>
-              <a:rPr lang="en-US" sz="2000" dirty="0" smtClean="0"/>
-              <a:t>Guthrie: $5,000</a:t>
-            </a:r>
-            <a:endParaRPr lang="en-US" sz="2000" dirty="0"/>
+              <a:t>Arlo Guthrie: $5,000</a:t>
+            </a:r>
           </a:p>
           <a:p>
             <a:pPr marL="285750" indent="-285750">
@@ -14711,13 +14494,8 @@
             </a:pPr>
             <a:r>
               <a:rPr lang="en-US" sz="2000" dirty="0"/>
-              <a:t>Crosby, Stills, Nash &amp; </a:t>
-            </a:r>
-            <a:r>
-              <a:rPr lang="en-US" sz="2000" dirty="0" smtClean="0"/>
-              <a:t>Young: $5,000</a:t>
-            </a:r>
-            <a:endParaRPr lang="en-US" sz="2000" dirty="0"/>
+              <a:t>Crosby, Stills, Nash &amp; Young: $5,000</a:t>
+            </a:r>
           </a:p>
           <a:p>
             <a:pPr marL="285750" indent="-285750">
@@ -14726,13 +14504,8 @@
             </a:pPr>
             <a:r>
               <a:rPr lang="en-US" sz="2000" dirty="0"/>
-              <a:t>Ravi </a:t>
-            </a:r>
-            <a:r>
-              <a:rPr lang="en-US" sz="2000" dirty="0" smtClean="0"/>
-              <a:t>Shankar: $4,500</a:t>
-            </a:r>
-            <a:endParaRPr lang="en-US" sz="2000" dirty="0"/>
+              <a:t>Ravi Shankar: $4,500</a:t>
+            </a:r>
           </a:p>
           <a:p>
             <a:pPr marL="285750" indent="-285750">
@@ -14741,13 +14514,8 @@
             </a:pPr>
             <a:r>
               <a:rPr lang="en-US" sz="2000" dirty="0"/>
-              <a:t>Johnny </a:t>
-            </a:r>
-            <a:r>
-              <a:rPr lang="en-US" sz="2000" dirty="0" smtClean="0"/>
-              <a:t>Winter: $3,750</a:t>
-            </a:r>
-            <a:endParaRPr lang="en-US" sz="2000" dirty="0"/>
+              <a:t>Johnny Winter: $3,750</a:t>
+            </a:r>
           </a:p>
           <a:p>
             <a:pPr marL="285750" indent="-285750">
@@ -14756,13 +14524,8 @@
             </a:pPr>
             <a:r>
               <a:rPr lang="en-US" sz="2000" dirty="0"/>
-              <a:t>Ten Years </a:t>
-            </a:r>
-            <a:r>
-              <a:rPr lang="en-US" sz="2000" dirty="0" smtClean="0"/>
-              <a:t>After: $3,250</a:t>
-            </a:r>
-            <a:endParaRPr lang="en-US" sz="2000" dirty="0"/>
+              <a:t>Ten Years After: $3,250</a:t>
+            </a:r>
           </a:p>
           <a:p>
             <a:pPr marL="285750" indent="-285750">
@@ -14771,13 +14534,8 @@
             </a:pPr>
             <a:r>
               <a:rPr lang="en-US" sz="2000" dirty="0"/>
-              <a:t>Country Joe and the </a:t>
-            </a:r>
-            <a:r>
-              <a:rPr lang="en-US" sz="2000" dirty="0" smtClean="0"/>
-              <a:t>Fish: $2,500</a:t>
-            </a:r>
-            <a:endParaRPr lang="en-US" sz="2000" dirty="0"/>
+              <a:t>Country Joe and the Fish: $2,500</a:t>
+            </a:r>
           </a:p>
           <a:p>
             <a:pPr marL="285750" indent="-285750">
@@ -14786,13 +14544,8 @@
             </a:pPr>
             <a:r>
               <a:rPr lang="en-US" sz="2000" dirty="0"/>
-              <a:t>Grateful </a:t>
-            </a:r>
-            <a:r>
-              <a:rPr lang="en-US" sz="2000" dirty="0" smtClean="0"/>
-              <a:t>Dead: $2,500</a:t>
-            </a:r>
-            <a:endParaRPr lang="en-US" sz="2000" dirty="0"/>
+              <a:t>Grateful Dead: $2,500</a:t>
+            </a:r>
           </a:p>
           <a:p>
             <a:pPr marL="285750" indent="-285750">
@@ -14801,13 +14554,8 @@
             </a:pPr>
             <a:r>
               <a:rPr lang="en-US" sz="2000" dirty="0"/>
-              <a:t>Joe </a:t>
-            </a:r>
-            <a:r>
-              <a:rPr lang="en-US" sz="2000" dirty="0" smtClean="0"/>
-              <a:t>Cocker: $1,375</a:t>
-            </a:r>
-            <a:endParaRPr lang="en-US" sz="2000" dirty="0"/>
+              <a:t>Joe Cocker: $1,375</a:t>
+            </a:r>
           </a:p>
           <a:p>
             <a:pPr marL="285750" indent="-285750">
@@ -14815,10 +14563,9 @@
               <a:buChar char="•"/>
             </a:pPr>
             <a:r>
-              <a:rPr lang="en-US" sz="2000" dirty="0" smtClean="0"/>
+              <a:rPr lang="en-US" sz="2000" dirty="0"/>
               <a:t>Santana: $750</a:t>
             </a:r>
-            <a:endParaRPr lang="en-US" sz="2000" dirty="0"/>
           </a:p>
           <a:p>
             <a:pPr marL="285750" indent="-285750">
@@ -14830,14 +14577,13 @@
               <a:t>Sha Na </a:t>
             </a:r>
             <a:r>
-              <a:rPr lang="en-US" sz="2000" dirty="0" err="1" smtClean="0"/>
+              <a:rPr lang="en-US" sz="2000" dirty="0" err="1"/>
               <a:t>Na</a:t>
             </a:r>
             <a:r>
-              <a:rPr lang="en-US" sz="2000" dirty="0" smtClean="0"/>
+              <a:rPr lang="en-US" sz="2000" dirty="0"/>
               <a:t>: $700</a:t>
             </a:r>
-            <a:endParaRPr lang="en-US" sz="2000" dirty="0"/>
           </a:p>
         </p:txBody>
       </p:sp>
@@ -14851,13 +14597,6 @@
   <p:clrMapOvr>
     <a:masterClrMapping/>
   </p:clrMapOvr>
-  <p:timing>
-    <p:tnLst>
-      <p:par>
-        <p:cTn id="1" dur="indefinite" restart="never" nodeType="tmRoot"/>
-      </p:par>
-    </p:tnLst>
-  </p:timing>
 </p:sld>
 </file>
 

</xml_diff>